<commit_message>
Doc updates and gitignore.
</commit_message>
<xml_diff>
--- a/img/conceptual-model.pptx
+++ b/img/conceptual-model.pptx
@@ -6,6 +6,7 @@
   </p:sldMasterIdLst>
   <p:sldIdLst>
     <p:sldId id="256" r:id="rId2"/>
+    <p:sldId id="257" r:id="rId3"/>
   </p:sldIdLst>
   <p:sldSz cx="12192000" cy="6858000"/>
   <p:notesSz cx="6858000" cy="9144000"/>
@@ -104,6 +105,11 @@
       </a:defRPr>
     </a:lvl9pPr>
   </p:defaultTextStyle>
+  <p:extLst>
+    <p:ext uri="{EFAFB233-063F-42B5-8137-9DF3F51BA10A}">
+      <p15:sldGuideLst xmlns:p15="http://schemas.microsoft.com/office/powerpoint/2012/main"/>
+    </p:ext>
+  </p:extLst>
 </p:presentation>
 </file>
 
@@ -238,7 +244,7 @@
           <a:p>
             <a:fld id="{6FDC6811-2DC1-4BE5-9413-38A6B907E1A2}" type="datetimeFigureOut">
               <a:rPr lang="en-GB" smtClean="0"/>
-              <a:t>17/04/2018</a:t>
+              <a:t>23/04/2018</a:t>
             </a:fld>
             <a:endParaRPr lang="en-GB"/>
           </a:p>
@@ -408,7 +414,7 @@
           <a:p>
             <a:fld id="{6FDC6811-2DC1-4BE5-9413-38A6B907E1A2}" type="datetimeFigureOut">
               <a:rPr lang="en-GB" smtClean="0"/>
-              <a:t>17/04/2018</a:t>
+              <a:t>23/04/2018</a:t>
             </a:fld>
             <a:endParaRPr lang="en-GB"/>
           </a:p>
@@ -588,7 +594,7 @@
           <a:p>
             <a:fld id="{6FDC6811-2DC1-4BE5-9413-38A6B907E1A2}" type="datetimeFigureOut">
               <a:rPr lang="en-GB" smtClean="0"/>
-              <a:t>17/04/2018</a:t>
+              <a:t>23/04/2018</a:t>
             </a:fld>
             <a:endParaRPr lang="en-GB"/>
           </a:p>
@@ -758,7 +764,7 @@
           <a:p>
             <a:fld id="{6FDC6811-2DC1-4BE5-9413-38A6B907E1A2}" type="datetimeFigureOut">
               <a:rPr lang="en-GB" smtClean="0"/>
-              <a:t>17/04/2018</a:t>
+              <a:t>23/04/2018</a:t>
             </a:fld>
             <a:endParaRPr lang="en-GB"/>
           </a:p>
@@ -1004,7 +1010,7 @@
           <a:p>
             <a:fld id="{6FDC6811-2DC1-4BE5-9413-38A6B907E1A2}" type="datetimeFigureOut">
               <a:rPr lang="en-GB" smtClean="0"/>
-              <a:t>17/04/2018</a:t>
+              <a:t>23/04/2018</a:t>
             </a:fld>
             <a:endParaRPr lang="en-GB"/>
           </a:p>
@@ -1236,7 +1242,7 @@
           <a:p>
             <a:fld id="{6FDC6811-2DC1-4BE5-9413-38A6B907E1A2}" type="datetimeFigureOut">
               <a:rPr lang="en-GB" smtClean="0"/>
-              <a:t>17/04/2018</a:t>
+              <a:t>23/04/2018</a:t>
             </a:fld>
             <a:endParaRPr lang="en-GB"/>
           </a:p>
@@ -1603,7 +1609,7 @@
           <a:p>
             <a:fld id="{6FDC6811-2DC1-4BE5-9413-38A6B907E1A2}" type="datetimeFigureOut">
               <a:rPr lang="en-GB" smtClean="0"/>
-              <a:t>17/04/2018</a:t>
+              <a:t>23/04/2018</a:t>
             </a:fld>
             <a:endParaRPr lang="en-GB"/>
           </a:p>
@@ -1721,7 +1727,7 @@
           <a:p>
             <a:fld id="{6FDC6811-2DC1-4BE5-9413-38A6B907E1A2}" type="datetimeFigureOut">
               <a:rPr lang="en-GB" smtClean="0"/>
-              <a:t>17/04/2018</a:t>
+              <a:t>23/04/2018</a:t>
             </a:fld>
             <a:endParaRPr lang="en-GB"/>
           </a:p>
@@ -1816,7 +1822,7 @@
           <a:p>
             <a:fld id="{6FDC6811-2DC1-4BE5-9413-38A6B907E1A2}" type="datetimeFigureOut">
               <a:rPr lang="en-GB" smtClean="0"/>
-              <a:t>17/04/2018</a:t>
+              <a:t>23/04/2018</a:t>
             </a:fld>
             <a:endParaRPr lang="en-GB"/>
           </a:p>
@@ -2093,7 +2099,7 @@
           <a:p>
             <a:fld id="{6FDC6811-2DC1-4BE5-9413-38A6B907E1A2}" type="datetimeFigureOut">
               <a:rPr lang="en-GB" smtClean="0"/>
-              <a:t>17/04/2018</a:t>
+              <a:t>23/04/2018</a:t>
             </a:fld>
             <a:endParaRPr lang="en-GB"/>
           </a:p>
@@ -2346,7 +2352,7 @@
           <a:p>
             <a:fld id="{6FDC6811-2DC1-4BE5-9413-38A6B907E1A2}" type="datetimeFigureOut">
               <a:rPr lang="en-GB" smtClean="0"/>
-              <a:t>17/04/2018</a:t>
+              <a:t>23/04/2018</a:t>
             </a:fld>
             <a:endParaRPr lang="en-GB"/>
           </a:p>
@@ -2559,7 +2565,7 @@
           <a:p>
             <a:fld id="{6FDC6811-2DC1-4BE5-9413-38A6B907E1A2}" type="datetimeFigureOut">
               <a:rPr lang="en-GB" smtClean="0"/>
-              <a:t>17/04/2018</a:t>
+              <a:t>23/04/2018</a:t>
             </a:fld>
             <a:endParaRPr lang="en-GB"/>
           </a:p>
@@ -3339,8 +3345,8 @@
             </a:fontRef>
           </p:style>
         </p:cxnSp>
-        <mc:AlternateContent xmlns:mc="http://schemas.openxmlformats.org/markup-compatibility/2006">
-          <mc:Choice xmlns:a14="http://schemas.microsoft.com/office/drawing/2010/main" Requires="a14">
+        <mc:AlternateContent xmlns:mc="http://schemas.openxmlformats.org/markup-compatibility/2006" xmlns:a14="http://schemas.microsoft.com/office/drawing/2010/main">
+          <mc:Choice Requires="a14">
             <p:sp>
               <p:nvSpPr>
                 <p:cNvPr id="18" name="TextBox 17"/>
@@ -3363,6 +3369,7 @@
                 </a:bodyPr>
                 <a:lstStyle/>
                 <a:p>
+                  <a:pPr/>
                   <a14:m>
                     <m:oMathPara xmlns:m="http://schemas.openxmlformats.org/officeDocument/2006/math">
                       <m:oMathParaPr>
@@ -3402,7 +3409,7 @@
               </p:txBody>
             </p:sp>
           </mc:Choice>
-          <mc:Fallback>
+          <mc:Fallback xmlns="">
             <p:sp>
               <p:nvSpPr>
                 <p:cNvPr id="18" name="TextBox 17"/>
@@ -3441,8 +3448,8 @@
             </p:sp>
           </mc:Fallback>
         </mc:AlternateContent>
-        <mc:AlternateContent xmlns:mc="http://schemas.openxmlformats.org/markup-compatibility/2006">
-          <mc:Choice xmlns:a14="http://schemas.microsoft.com/office/drawing/2010/main" Requires="a14">
+        <mc:AlternateContent xmlns:mc="http://schemas.openxmlformats.org/markup-compatibility/2006" xmlns:a14="http://schemas.microsoft.com/office/drawing/2010/main">
+          <mc:Choice Requires="a14">
             <p:sp>
               <p:nvSpPr>
                 <p:cNvPr id="19" name="TextBox 18"/>
@@ -3465,6 +3472,7 @@
                 </a:bodyPr>
                 <a:lstStyle/>
                 <a:p>
+                  <a:pPr/>
                   <a14:m>
                     <m:oMathPara xmlns:m="http://schemas.openxmlformats.org/officeDocument/2006/math">
                       <m:oMathParaPr>
@@ -3504,7 +3512,7 @@
               </p:txBody>
             </p:sp>
           </mc:Choice>
-          <mc:Fallback>
+          <mc:Fallback xmlns="">
             <p:sp>
               <p:nvSpPr>
                 <p:cNvPr id="19" name="TextBox 18"/>
@@ -3543,8 +3551,8 @@
             </p:sp>
           </mc:Fallback>
         </mc:AlternateContent>
-        <mc:AlternateContent xmlns:mc="http://schemas.openxmlformats.org/markup-compatibility/2006">
-          <mc:Choice xmlns:a14="http://schemas.microsoft.com/office/drawing/2010/main" Requires="a14">
+        <mc:AlternateContent xmlns:mc="http://schemas.openxmlformats.org/markup-compatibility/2006" xmlns:a14="http://schemas.microsoft.com/office/drawing/2010/main">
+          <mc:Choice Requires="a14">
             <p:sp>
               <p:nvSpPr>
                 <p:cNvPr id="22" name="TextBox 21"/>
@@ -3592,7 +3600,7 @@
               </p:txBody>
             </p:sp>
           </mc:Choice>
-          <mc:Fallback>
+          <mc:Fallback xmlns="">
             <p:sp>
               <p:nvSpPr>
                 <p:cNvPr id="22" name="TextBox 21"/>
@@ -3631,8 +3639,8 @@
             </p:sp>
           </mc:Fallback>
         </mc:AlternateContent>
-        <mc:AlternateContent xmlns:mc="http://schemas.openxmlformats.org/markup-compatibility/2006">
-          <mc:Choice xmlns:a14="http://schemas.microsoft.com/office/drawing/2010/main" Requires="a14">
+        <mc:AlternateContent xmlns:mc="http://schemas.openxmlformats.org/markup-compatibility/2006" xmlns:a14="http://schemas.microsoft.com/office/drawing/2010/main">
+          <mc:Choice Requires="a14">
             <p:sp>
               <p:nvSpPr>
                 <p:cNvPr id="23" name="TextBox 22"/>
@@ -3680,7 +3688,7 @@
               </p:txBody>
             </p:sp>
           </mc:Choice>
-          <mc:Fallback>
+          <mc:Fallback xmlns="">
             <p:sp>
               <p:nvSpPr>
                 <p:cNvPr id="23" name="TextBox 22"/>
@@ -3719,8 +3727,8 @@
             </p:sp>
           </mc:Fallback>
         </mc:AlternateContent>
-        <mc:AlternateContent xmlns:mc="http://schemas.openxmlformats.org/markup-compatibility/2006">
-          <mc:Choice xmlns:a14="http://schemas.microsoft.com/office/drawing/2010/main" Requires="a14">
+        <mc:AlternateContent xmlns:mc="http://schemas.openxmlformats.org/markup-compatibility/2006" xmlns:a14="http://schemas.microsoft.com/office/drawing/2010/main">
+          <mc:Choice Requires="a14">
             <p:sp>
               <p:nvSpPr>
                 <p:cNvPr id="24" name="TextBox 23"/>
@@ -3743,6 +3751,7 @@
                 </a:bodyPr>
                 <a:lstStyle/>
                 <a:p>
+                  <a:pPr/>
                   <a14:m>
                     <m:oMathPara xmlns:m="http://schemas.openxmlformats.org/officeDocument/2006/math">
                       <m:oMathParaPr>
@@ -3794,7 +3803,7 @@
               </p:txBody>
             </p:sp>
           </mc:Choice>
-          <mc:Fallback>
+          <mc:Fallback xmlns="">
             <p:sp>
               <p:nvSpPr>
                 <p:cNvPr id="24" name="TextBox 23"/>
@@ -3833,8 +3842,8 @@
             </p:sp>
           </mc:Fallback>
         </mc:AlternateContent>
-        <mc:AlternateContent xmlns:mc="http://schemas.openxmlformats.org/markup-compatibility/2006">
-          <mc:Choice xmlns:a14="http://schemas.microsoft.com/office/drawing/2010/main" Requires="a14">
+        <mc:AlternateContent xmlns:mc="http://schemas.openxmlformats.org/markup-compatibility/2006" xmlns:a14="http://schemas.microsoft.com/office/drawing/2010/main">
+          <mc:Choice Requires="a14">
             <p:sp>
               <p:nvSpPr>
                 <p:cNvPr id="25" name="TextBox 24"/>
@@ -3857,6 +3866,7 @@
                 </a:bodyPr>
                 <a:lstStyle/>
                 <a:p>
+                  <a:pPr/>
                   <a14:m>
                     <m:oMathPara xmlns:m="http://schemas.openxmlformats.org/officeDocument/2006/math">
                       <m:oMathParaPr>
@@ -3908,7 +3918,7 @@
               </p:txBody>
             </p:sp>
           </mc:Choice>
-          <mc:Fallback>
+          <mc:Fallback xmlns="">
             <p:sp>
               <p:nvSpPr>
                 <p:cNvPr id="25" name="TextBox 24"/>
@@ -4015,8 +4025,8 @@
             </a:fontRef>
           </p:style>
         </p:cxnSp>
-        <mc:AlternateContent xmlns:mc="http://schemas.openxmlformats.org/markup-compatibility/2006">
-          <mc:Choice xmlns:a14="http://schemas.microsoft.com/office/drawing/2010/main" Requires="a14">
+        <mc:AlternateContent xmlns:mc="http://schemas.openxmlformats.org/markup-compatibility/2006" xmlns:a14="http://schemas.microsoft.com/office/drawing/2010/main">
+          <mc:Choice Requires="a14">
             <p:sp>
               <p:nvSpPr>
                 <p:cNvPr id="29" name="TextBox 28"/>
@@ -4039,6 +4049,7 @@
                 </a:bodyPr>
                 <a:lstStyle/>
                 <a:p>
+                  <a:pPr/>
                   <a14:m>
                     <m:oMathPara xmlns:m="http://schemas.openxmlformats.org/officeDocument/2006/math">
                       <m:oMathParaPr>
@@ -4090,7 +4101,7 @@
               </p:txBody>
             </p:sp>
           </mc:Choice>
-          <mc:Fallback>
+          <mc:Fallback xmlns="">
             <p:sp>
               <p:nvSpPr>
                 <p:cNvPr id="29" name="TextBox 28"/>
@@ -4129,8 +4140,8 @@
             </p:sp>
           </mc:Fallback>
         </mc:AlternateContent>
-        <mc:AlternateContent xmlns:mc="http://schemas.openxmlformats.org/markup-compatibility/2006">
-          <mc:Choice xmlns:a14="http://schemas.microsoft.com/office/drawing/2010/main" Requires="a14">
+        <mc:AlternateContent xmlns:mc="http://schemas.openxmlformats.org/markup-compatibility/2006" xmlns:a14="http://schemas.microsoft.com/office/drawing/2010/main">
+          <mc:Choice Requires="a14">
             <p:sp>
               <p:nvSpPr>
                 <p:cNvPr id="30" name="TextBox 29"/>
@@ -4153,6 +4164,7 @@
                 </a:bodyPr>
                 <a:lstStyle/>
                 <a:p>
+                  <a:pPr/>
                   <a14:m>
                     <m:oMathPara xmlns:m="http://schemas.openxmlformats.org/officeDocument/2006/math">
                       <m:oMathParaPr>
@@ -4204,7 +4216,7 @@
               </p:txBody>
             </p:sp>
           </mc:Choice>
-          <mc:Fallback>
+          <mc:Fallback xmlns="">
             <p:sp>
               <p:nvSpPr>
                 <p:cNvPr id="30" name="TextBox 29"/>
@@ -4243,8 +4255,8 @@
             </p:sp>
           </mc:Fallback>
         </mc:AlternateContent>
-        <mc:AlternateContent xmlns:mc="http://schemas.openxmlformats.org/markup-compatibility/2006">
-          <mc:Choice xmlns:a14="http://schemas.microsoft.com/office/drawing/2010/main" Requires="a14">
+        <mc:AlternateContent xmlns:mc="http://schemas.openxmlformats.org/markup-compatibility/2006" xmlns:a14="http://schemas.microsoft.com/office/drawing/2010/main">
+          <mc:Choice Requires="a14">
             <p:sp>
               <p:nvSpPr>
                 <p:cNvPr id="31" name="TextBox 30"/>
@@ -4267,6 +4279,7 @@
                 </a:bodyPr>
                 <a:lstStyle/>
                 <a:p>
+                  <a:pPr/>
                   <a14:m>
                     <m:oMathPara xmlns:m="http://schemas.openxmlformats.org/officeDocument/2006/math">
                       <m:oMathParaPr>
@@ -4322,7 +4335,7 @@
               </p:txBody>
             </p:sp>
           </mc:Choice>
-          <mc:Fallback>
+          <mc:Fallback xmlns="">
             <p:sp>
               <p:nvSpPr>
                 <p:cNvPr id="31" name="TextBox 30"/>
@@ -4361,8 +4374,8 @@
             </p:sp>
           </mc:Fallback>
         </mc:AlternateContent>
-        <mc:AlternateContent xmlns:mc="http://schemas.openxmlformats.org/markup-compatibility/2006">
-          <mc:Choice xmlns:a14="http://schemas.microsoft.com/office/drawing/2010/main" Requires="a14">
+        <mc:AlternateContent xmlns:mc="http://schemas.openxmlformats.org/markup-compatibility/2006" xmlns:a14="http://schemas.microsoft.com/office/drawing/2010/main">
+          <mc:Choice Requires="a14">
             <p:sp>
               <p:nvSpPr>
                 <p:cNvPr id="32" name="TextBox 31"/>
@@ -4385,6 +4398,7 @@
                 </a:bodyPr>
                 <a:lstStyle/>
                 <a:p>
+                  <a:pPr/>
                   <a14:m>
                     <m:oMathPara xmlns:m="http://schemas.openxmlformats.org/officeDocument/2006/math">
                       <m:oMathParaPr>
@@ -4440,7 +4454,7 @@
               </p:txBody>
             </p:sp>
           </mc:Choice>
-          <mc:Fallback>
+          <mc:Fallback xmlns="">
             <p:sp>
               <p:nvSpPr>
                 <p:cNvPr id="32" name="TextBox 31"/>
@@ -4484,6 +4498,1572 @@
     <p:extLst>
       <p:ext uri="{BB962C8B-B14F-4D97-AF65-F5344CB8AC3E}">
         <p14:creationId xmlns:p14="http://schemas.microsoft.com/office/powerpoint/2010/main" val="290582734"/>
+      </p:ext>
+    </p:extLst>
+  </p:cSld>
+  <p:clrMapOvr>
+    <a:masterClrMapping/>
+  </p:clrMapOvr>
+</p:sld>
+</file>
+
+<file path=ppt/slides/slide2.xml><?xml version="1.0" encoding="utf-8"?>
+<p:sld xmlns:a="http://schemas.openxmlformats.org/drawingml/2006/main" xmlns:r="http://schemas.openxmlformats.org/officeDocument/2006/relationships" xmlns:p="http://schemas.openxmlformats.org/presentationml/2006/main">
+  <p:cSld>
+    <p:spTree>
+      <p:nvGrpSpPr>
+        <p:cNvPr id="1" name=""/>
+        <p:cNvGrpSpPr/>
+        <p:nvPr/>
+      </p:nvGrpSpPr>
+      <p:grpSpPr>
+        <a:xfrm>
+          <a:off x="0" y="0"/>
+          <a:ext cx="0" cy="0"/>
+          <a:chOff x="0" y="0"/>
+          <a:chExt cx="0" cy="0"/>
+        </a:xfrm>
+      </p:grpSpPr>
+      <p:grpSp>
+        <p:nvGrpSpPr>
+          <p:cNvPr id="4" name="Group 3"/>
+          <p:cNvGrpSpPr/>
+          <p:nvPr/>
+        </p:nvGrpSpPr>
+        <p:grpSpPr>
+          <a:xfrm>
+            <a:off x="2914919" y="1083435"/>
+            <a:ext cx="6592732" cy="4019764"/>
+            <a:chOff x="1700012" y="1429555"/>
+            <a:chExt cx="6592732" cy="4019764"/>
+          </a:xfrm>
+        </p:grpSpPr>
+        <p:cxnSp>
+          <p:nvCxnSpPr>
+            <p:cNvPr id="5" name="Straight Connector 4"/>
+            <p:cNvCxnSpPr/>
+            <p:nvPr/>
+          </p:nvCxnSpPr>
+          <p:spPr>
+            <a:xfrm>
+              <a:off x="1700012" y="1429555"/>
+              <a:ext cx="5821250" cy="0"/>
+            </a:xfrm>
+            <a:prstGeom prst="line">
+              <a:avLst/>
+            </a:prstGeom>
+            <a:ln w="38100"/>
+          </p:spPr>
+          <p:style>
+            <a:lnRef idx="1">
+              <a:schemeClr val="dk1"/>
+            </a:lnRef>
+            <a:fillRef idx="0">
+              <a:schemeClr val="dk1"/>
+            </a:fillRef>
+            <a:effectRef idx="0">
+              <a:schemeClr val="dk1"/>
+            </a:effectRef>
+            <a:fontRef idx="minor">
+              <a:schemeClr val="tx1"/>
+            </a:fontRef>
+          </p:style>
+        </p:cxnSp>
+        <p:cxnSp>
+          <p:nvCxnSpPr>
+            <p:cNvPr id="6" name="Straight Connector 5"/>
+            <p:cNvCxnSpPr/>
+            <p:nvPr/>
+          </p:nvCxnSpPr>
+          <p:spPr>
+            <a:xfrm>
+              <a:off x="1700012" y="3290552"/>
+              <a:ext cx="5821250" cy="0"/>
+            </a:xfrm>
+            <a:prstGeom prst="line">
+              <a:avLst/>
+            </a:prstGeom>
+            <a:ln w="38100"/>
+          </p:spPr>
+          <p:style>
+            <a:lnRef idx="1">
+              <a:schemeClr val="dk1"/>
+            </a:lnRef>
+            <a:fillRef idx="0">
+              <a:schemeClr val="dk1"/>
+            </a:fillRef>
+            <a:effectRef idx="0">
+              <a:schemeClr val="dk1"/>
+            </a:effectRef>
+            <a:fontRef idx="minor">
+              <a:schemeClr val="tx1"/>
+            </a:fontRef>
+          </p:style>
+        </p:cxnSp>
+        <p:cxnSp>
+          <p:nvCxnSpPr>
+            <p:cNvPr id="7" name="Straight Connector 6"/>
+            <p:cNvCxnSpPr/>
+            <p:nvPr/>
+          </p:nvCxnSpPr>
+          <p:spPr>
+            <a:xfrm>
+              <a:off x="1700012" y="5151550"/>
+              <a:ext cx="5821250" cy="0"/>
+            </a:xfrm>
+            <a:prstGeom prst="line">
+              <a:avLst/>
+            </a:prstGeom>
+            <a:ln w="38100"/>
+          </p:spPr>
+          <p:style>
+            <a:lnRef idx="1">
+              <a:schemeClr val="dk1"/>
+            </a:lnRef>
+            <a:fillRef idx="0">
+              <a:schemeClr val="dk1"/>
+            </a:fillRef>
+            <a:effectRef idx="0">
+              <a:schemeClr val="dk1"/>
+            </a:effectRef>
+            <a:fontRef idx="minor">
+              <a:schemeClr val="tx1"/>
+            </a:fontRef>
+          </p:style>
+        </p:cxnSp>
+        <p:cxnSp>
+          <p:nvCxnSpPr>
+            <p:cNvPr id="8" name="Straight Arrow Connector 7"/>
+            <p:cNvCxnSpPr/>
+            <p:nvPr/>
+          </p:nvCxnSpPr>
+          <p:spPr>
+            <a:xfrm>
+              <a:off x="2086377" y="1429555"/>
+              <a:ext cx="0" cy="1860997"/>
+            </a:xfrm>
+            <a:prstGeom prst="straightConnector1">
+              <a:avLst/>
+            </a:prstGeom>
+            <a:ln>
+              <a:headEnd type="triangle"/>
+              <a:tailEnd type="triangle"/>
+            </a:ln>
+          </p:spPr>
+          <p:style>
+            <a:lnRef idx="1">
+              <a:schemeClr val="dk1"/>
+            </a:lnRef>
+            <a:fillRef idx="0">
+              <a:schemeClr val="dk1"/>
+            </a:fillRef>
+            <a:effectRef idx="0">
+              <a:schemeClr val="dk1"/>
+            </a:effectRef>
+            <a:fontRef idx="minor">
+              <a:schemeClr val="tx1"/>
+            </a:fontRef>
+          </p:style>
+        </p:cxnSp>
+        <p:cxnSp>
+          <p:nvCxnSpPr>
+            <p:cNvPr id="9" name="Straight Arrow Connector 8"/>
+            <p:cNvCxnSpPr/>
+            <p:nvPr/>
+          </p:nvCxnSpPr>
+          <p:spPr>
+            <a:xfrm>
+              <a:off x="2086377" y="3290553"/>
+              <a:ext cx="0" cy="1860997"/>
+            </a:xfrm>
+            <a:prstGeom prst="straightConnector1">
+              <a:avLst/>
+            </a:prstGeom>
+            <a:ln>
+              <a:headEnd type="triangle"/>
+              <a:tailEnd type="triangle"/>
+            </a:ln>
+          </p:spPr>
+          <p:style>
+            <a:lnRef idx="1">
+              <a:schemeClr val="dk1"/>
+            </a:lnRef>
+            <a:fillRef idx="0">
+              <a:schemeClr val="dk1"/>
+            </a:fillRef>
+            <a:effectRef idx="0">
+              <a:schemeClr val="dk1"/>
+            </a:effectRef>
+            <a:fontRef idx="minor">
+              <a:schemeClr val="tx1"/>
+            </a:fontRef>
+          </p:style>
+        </p:cxnSp>
+        <p:cxnSp>
+          <p:nvCxnSpPr>
+            <p:cNvPr id="10" name="Straight Connector 9"/>
+            <p:cNvCxnSpPr/>
+            <p:nvPr/>
+          </p:nvCxnSpPr>
+          <p:spPr>
+            <a:xfrm>
+              <a:off x="1700012" y="2859110"/>
+              <a:ext cx="5821250" cy="0"/>
+            </a:xfrm>
+            <a:prstGeom prst="line">
+              <a:avLst/>
+            </a:prstGeom>
+            <a:ln w="12700">
+              <a:prstDash val="dash"/>
+            </a:ln>
+          </p:spPr>
+          <p:style>
+            <a:lnRef idx="1">
+              <a:schemeClr val="dk1"/>
+            </a:lnRef>
+            <a:fillRef idx="0">
+              <a:schemeClr val="dk1"/>
+            </a:fillRef>
+            <a:effectRef idx="0">
+              <a:schemeClr val="dk1"/>
+            </a:effectRef>
+            <a:fontRef idx="minor">
+              <a:schemeClr val="tx1"/>
+            </a:fontRef>
+          </p:style>
+        </p:cxnSp>
+        <p:cxnSp>
+          <p:nvCxnSpPr>
+            <p:cNvPr id="11" name="Straight Connector 10"/>
+            <p:cNvCxnSpPr/>
+            <p:nvPr/>
+          </p:nvCxnSpPr>
+          <p:spPr>
+            <a:xfrm>
+              <a:off x="1700012" y="3709115"/>
+              <a:ext cx="5821250" cy="0"/>
+            </a:xfrm>
+            <a:prstGeom prst="line">
+              <a:avLst/>
+            </a:prstGeom>
+            <a:ln w="12700">
+              <a:prstDash val="dash"/>
+            </a:ln>
+          </p:spPr>
+          <p:style>
+            <a:lnRef idx="1">
+              <a:schemeClr val="dk1"/>
+            </a:lnRef>
+            <a:fillRef idx="0">
+              <a:schemeClr val="dk1"/>
+            </a:fillRef>
+            <a:effectRef idx="0">
+              <a:schemeClr val="dk1"/>
+            </a:effectRef>
+            <a:fontRef idx="minor">
+              <a:schemeClr val="tx1"/>
+            </a:fontRef>
+          </p:style>
+        </p:cxnSp>
+        <p:cxnSp>
+          <p:nvCxnSpPr>
+            <p:cNvPr id="12" name="Straight Connector 11"/>
+            <p:cNvCxnSpPr/>
+            <p:nvPr/>
+          </p:nvCxnSpPr>
+          <p:spPr>
+            <a:xfrm>
+              <a:off x="1700012" y="4945487"/>
+              <a:ext cx="5821250" cy="0"/>
+            </a:xfrm>
+            <a:prstGeom prst="line">
+              <a:avLst/>
+            </a:prstGeom>
+            <a:ln w="12700">
+              <a:prstDash val="dash"/>
+            </a:ln>
+          </p:spPr>
+          <p:style>
+            <a:lnRef idx="1">
+              <a:schemeClr val="dk1"/>
+            </a:lnRef>
+            <a:fillRef idx="0">
+              <a:schemeClr val="dk1"/>
+            </a:fillRef>
+            <a:effectRef idx="0">
+              <a:schemeClr val="dk1"/>
+            </a:effectRef>
+            <a:fontRef idx="minor">
+              <a:schemeClr val="tx1"/>
+            </a:fontRef>
+          </p:style>
+        </p:cxnSp>
+        <p:cxnSp>
+          <p:nvCxnSpPr>
+            <p:cNvPr id="13" name="Straight Connector 12"/>
+            <p:cNvCxnSpPr/>
+            <p:nvPr/>
+          </p:nvCxnSpPr>
+          <p:spPr>
+            <a:xfrm>
+              <a:off x="1700012" y="5370490"/>
+              <a:ext cx="5821250" cy="0"/>
+            </a:xfrm>
+            <a:prstGeom prst="line">
+              <a:avLst/>
+            </a:prstGeom>
+            <a:ln w="12700">
+              <a:prstDash val="dash"/>
+            </a:ln>
+          </p:spPr>
+          <p:style>
+            <a:lnRef idx="1">
+              <a:schemeClr val="dk1"/>
+            </a:lnRef>
+            <a:fillRef idx="0">
+              <a:schemeClr val="dk1"/>
+            </a:fillRef>
+            <a:effectRef idx="0">
+              <a:schemeClr val="dk1"/>
+            </a:effectRef>
+            <a:fontRef idx="minor">
+              <a:schemeClr val="tx1"/>
+            </a:fontRef>
+          </p:style>
+        </p:cxnSp>
+        <p:cxnSp>
+          <p:nvCxnSpPr>
+            <p:cNvPr id="14" name="Straight Arrow Connector 13"/>
+            <p:cNvCxnSpPr/>
+            <p:nvPr/>
+          </p:nvCxnSpPr>
+          <p:spPr>
+            <a:xfrm>
+              <a:off x="7328079" y="2859110"/>
+              <a:ext cx="0" cy="431442"/>
+            </a:xfrm>
+            <a:prstGeom prst="straightConnector1">
+              <a:avLst/>
+            </a:prstGeom>
+            <a:ln>
+              <a:headEnd type="triangle"/>
+              <a:tailEnd type="triangle"/>
+            </a:ln>
+          </p:spPr>
+          <p:style>
+            <a:lnRef idx="1">
+              <a:schemeClr val="dk1"/>
+            </a:lnRef>
+            <a:fillRef idx="0">
+              <a:schemeClr val="dk1"/>
+            </a:fillRef>
+            <a:effectRef idx="0">
+              <a:schemeClr val="dk1"/>
+            </a:effectRef>
+            <a:fontRef idx="minor">
+              <a:schemeClr val="tx1"/>
+            </a:fontRef>
+          </p:style>
+        </p:cxnSp>
+        <p:cxnSp>
+          <p:nvCxnSpPr>
+            <p:cNvPr id="15" name="Straight Arrow Connector 14"/>
+            <p:cNvCxnSpPr/>
+            <p:nvPr/>
+          </p:nvCxnSpPr>
+          <p:spPr>
+            <a:xfrm>
+              <a:off x="7328079" y="3290552"/>
+              <a:ext cx="0" cy="431442"/>
+            </a:xfrm>
+            <a:prstGeom prst="straightConnector1">
+              <a:avLst/>
+            </a:prstGeom>
+            <a:ln>
+              <a:headEnd type="triangle"/>
+              <a:tailEnd type="triangle"/>
+            </a:ln>
+          </p:spPr>
+          <p:style>
+            <a:lnRef idx="1">
+              <a:schemeClr val="dk1"/>
+            </a:lnRef>
+            <a:fillRef idx="0">
+              <a:schemeClr val="dk1"/>
+            </a:fillRef>
+            <a:effectRef idx="0">
+              <a:schemeClr val="dk1"/>
+            </a:effectRef>
+            <a:fontRef idx="minor">
+              <a:schemeClr val="tx1"/>
+            </a:fontRef>
+          </p:style>
+        </p:cxnSp>
+        <mc:AlternateContent xmlns:mc="http://schemas.openxmlformats.org/markup-compatibility/2006" xmlns:a14="http://schemas.microsoft.com/office/drawing/2010/main">
+          <mc:Choice Requires="a14">
+            <p:sp>
+              <p:nvSpPr>
+                <p:cNvPr id="16" name="TextBox 15"/>
+                <p:cNvSpPr txBox="1"/>
+                <p:nvPr/>
+              </p:nvSpPr>
+              <p:spPr>
+                <a:xfrm>
+                  <a:off x="1700012" y="2175387"/>
+                  <a:ext cx="472630" cy="369332"/>
+                </a:xfrm>
+                <a:prstGeom prst="rect">
+                  <a:avLst/>
+                </a:prstGeom>
+                <a:noFill/>
+              </p:spPr>
+              <p:txBody>
+                <a:bodyPr wrap="none" rtlCol="0">
+                  <a:spAutoFit/>
+                </a:bodyPr>
+                <a:lstStyle/>
+                <a:p>
+                  <a:pPr/>
+                  <a14:m>
+                    <m:oMathPara xmlns:m="http://schemas.openxmlformats.org/officeDocument/2006/math">
+                      <m:oMathParaPr>
+                        <m:jc m:val="centerGroup"/>
+                      </m:oMathParaPr>
+                      <m:oMath xmlns:m="http://schemas.openxmlformats.org/officeDocument/2006/math">
+                        <m:sSub>
+                          <m:sSubPr>
+                            <m:ctrlPr>
+                              <a:rPr lang="en-GB" b="0" i="1" smtClean="0">
+                                <a:latin typeface="Cambria Math" panose="02040503050406030204" pitchFamily="18" charset="0"/>
+                              </a:rPr>
+                            </m:ctrlPr>
+                          </m:sSubPr>
+                          <m:e>
+                            <m:r>
+                              <a:rPr lang="en-GB" b="0" i="1" smtClean="0">
+                                <a:latin typeface="Cambria Math" panose="02040503050406030204" pitchFamily="18" charset="0"/>
+                              </a:rPr>
+                              <m:t>𝑑</m:t>
+                            </m:r>
+                          </m:e>
+                          <m:sub>
+                            <m:r>
+                              <a:rPr lang="en-GB" b="0" i="1" smtClean="0">
+                                <a:latin typeface="Cambria Math" panose="02040503050406030204" pitchFamily="18" charset="0"/>
+                              </a:rPr>
+                              <m:t>1</m:t>
+                            </m:r>
+                          </m:sub>
+                        </m:sSub>
+                      </m:oMath>
+                    </m:oMathPara>
+                  </a14:m>
+                  <a:endParaRPr lang="en-GB" b="0" dirty="0" smtClean="0"/>
+                </a:p>
+              </p:txBody>
+            </p:sp>
+          </mc:Choice>
+          <mc:Fallback xmlns="">
+            <p:sp>
+              <p:nvSpPr>
+                <p:cNvPr id="18" name="TextBox 17"/>
+                <p:cNvSpPr txBox="1">
+                  <a:spLocks noRot="1" noChangeAspect="1" noMove="1" noResize="1" noEditPoints="1" noAdjustHandles="1" noChangeArrowheads="1" noChangeShapeType="1" noTextEdit="1"/>
+                </p:cNvSpPr>
+                <p:nvPr/>
+              </p:nvSpPr>
+              <p:spPr>
+                <a:xfrm>
+                  <a:off x="1700012" y="2175387"/>
+                  <a:ext cx="472630" cy="369332"/>
+                </a:xfrm>
+                <a:prstGeom prst="rect">
+                  <a:avLst/>
+                </a:prstGeom>
+                <a:blipFill>
+                  <a:blip r:embed="rId2"/>
+                  <a:stretch>
+                    <a:fillRect/>
+                  </a:stretch>
+                </a:blipFill>
+              </p:spPr>
+              <p:txBody>
+                <a:bodyPr/>
+                <a:lstStyle/>
+                <a:p>
+                  <a:r>
+                    <a:rPr lang="en-GB">
+                      <a:noFill/>
+                    </a:rPr>
+                    <a:t> </a:t>
+                  </a:r>
+                </a:p>
+              </p:txBody>
+            </p:sp>
+          </mc:Fallback>
+        </mc:AlternateContent>
+        <mc:AlternateContent xmlns:mc="http://schemas.openxmlformats.org/markup-compatibility/2006" xmlns:a14="http://schemas.microsoft.com/office/drawing/2010/main">
+          <mc:Choice Requires="a14">
+            <p:sp>
+              <p:nvSpPr>
+                <p:cNvPr id="17" name="TextBox 16"/>
+                <p:cNvSpPr txBox="1"/>
+                <p:nvPr/>
+              </p:nvSpPr>
+              <p:spPr>
+                <a:xfrm>
+                  <a:off x="1700012" y="4020288"/>
+                  <a:ext cx="477951" cy="369332"/>
+                </a:xfrm>
+                <a:prstGeom prst="rect">
+                  <a:avLst/>
+                </a:prstGeom>
+                <a:noFill/>
+              </p:spPr>
+              <p:txBody>
+                <a:bodyPr wrap="none" rtlCol="0">
+                  <a:spAutoFit/>
+                </a:bodyPr>
+                <a:lstStyle/>
+                <a:p>
+                  <a:pPr/>
+                  <a14:m>
+                    <m:oMathPara xmlns:m="http://schemas.openxmlformats.org/officeDocument/2006/math">
+                      <m:oMathParaPr>
+                        <m:jc m:val="centerGroup"/>
+                      </m:oMathParaPr>
+                      <m:oMath xmlns:m="http://schemas.openxmlformats.org/officeDocument/2006/math">
+                        <m:sSub>
+                          <m:sSubPr>
+                            <m:ctrlPr>
+                              <a:rPr lang="en-GB" b="0" i="1" smtClean="0">
+                                <a:latin typeface="Cambria Math" panose="02040503050406030204" pitchFamily="18" charset="0"/>
+                              </a:rPr>
+                            </m:ctrlPr>
+                          </m:sSubPr>
+                          <m:e>
+                            <m:r>
+                              <a:rPr lang="en-GB" b="0" i="1" smtClean="0">
+                                <a:latin typeface="Cambria Math" panose="02040503050406030204" pitchFamily="18" charset="0"/>
+                              </a:rPr>
+                              <m:t>𝑑</m:t>
+                            </m:r>
+                          </m:e>
+                          <m:sub>
+                            <m:r>
+                              <a:rPr lang="en-GB" b="0" i="1" smtClean="0">
+                                <a:latin typeface="Cambria Math" panose="02040503050406030204" pitchFamily="18" charset="0"/>
+                              </a:rPr>
+                              <m:t>2</m:t>
+                            </m:r>
+                          </m:sub>
+                        </m:sSub>
+                      </m:oMath>
+                    </m:oMathPara>
+                  </a14:m>
+                  <a:endParaRPr lang="en-GB" b="0" dirty="0" smtClean="0"/>
+                </a:p>
+              </p:txBody>
+            </p:sp>
+          </mc:Choice>
+          <mc:Fallback xmlns="">
+            <p:sp>
+              <p:nvSpPr>
+                <p:cNvPr id="19" name="TextBox 18"/>
+                <p:cNvSpPr txBox="1">
+                  <a:spLocks noRot="1" noChangeAspect="1" noMove="1" noResize="1" noEditPoints="1" noAdjustHandles="1" noChangeArrowheads="1" noChangeShapeType="1" noTextEdit="1"/>
+                </p:cNvSpPr>
+                <p:nvPr/>
+              </p:nvSpPr>
+              <p:spPr>
+                <a:xfrm>
+                  <a:off x="1700012" y="4020288"/>
+                  <a:ext cx="477951" cy="369332"/>
+                </a:xfrm>
+                <a:prstGeom prst="rect">
+                  <a:avLst/>
+                </a:prstGeom>
+                <a:blipFill>
+                  <a:blip r:embed="rId3"/>
+                  <a:stretch>
+                    <a:fillRect/>
+                  </a:stretch>
+                </a:blipFill>
+              </p:spPr>
+              <p:txBody>
+                <a:bodyPr/>
+                <a:lstStyle/>
+                <a:p>
+                  <a:r>
+                    <a:rPr lang="en-GB">
+                      <a:noFill/>
+                    </a:rPr>
+                    <a:t> </a:t>
+                  </a:r>
+                </a:p>
+              </p:txBody>
+            </p:sp>
+          </mc:Fallback>
+        </mc:AlternateContent>
+        <mc:AlternateContent xmlns:mc="http://schemas.openxmlformats.org/markup-compatibility/2006" xmlns:a14="http://schemas.microsoft.com/office/drawing/2010/main">
+          <mc:Choice Requires="a14">
+            <p:sp>
+              <p:nvSpPr>
+                <p:cNvPr id="18" name="TextBox 17"/>
+                <p:cNvSpPr txBox="1"/>
+                <p:nvPr/>
+              </p:nvSpPr>
+              <p:spPr>
+                <a:xfrm>
+                  <a:off x="5932172" y="2180045"/>
+                  <a:ext cx="1589089" cy="369332"/>
+                </a:xfrm>
+                <a:prstGeom prst="rect">
+                  <a:avLst/>
+                </a:prstGeom>
+                <a:noFill/>
+              </p:spPr>
+              <p:txBody>
+                <a:bodyPr wrap="none" rtlCol="0">
+                  <a:spAutoFit/>
+                </a:bodyPr>
+                <a:lstStyle/>
+                <a:p>
+                  <a:r>
+                    <a:rPr lang="en-GB" dirty="0" smtClean="0"/>
+                    <a:t>Soil layer </a:t>
+                  </a:r>
+                  <a14:m>
+                    <m:oMath xmlns:m="http://schemas.openxmlformats.org/officeDocument/2006/math">
+                      <m:r>
+                        <a:rPr lang="en-GB" b="0" i="1" smtClean="0">
+                          <a:latin typeface="Cambria Math" panose="02040503050406030204" pitchFamily="18" charset="0"/>
+                        </a:rPr>
+                        <m:t>𝑙</m:t>
+                      </m:r>
+                      <m:r>
+                        <a:rPr lang="en-GB" b="0" i="1" smtClean="0">
+                          <a:latin typeface="Cambria Math" panose="02040503050406030204" pitchFamily="18" charset="0"/>
+                        </a:rPr>
+                        <m:t>=1</m:t>
+                      </m:r>
+                    </m:oMath>
+                  </a14:m>
+                  <a:endParaRPr lang="en-GB" dirty="0"/>
+                </a:p>
+              </p:txBody>
+            </p:sp>
+          </mc:Choice>
+          <mc:Fallback xmlns="">
+            <p:sp>
+              <p:nvSpPr>
+                <p:cNvPr id="22" name="TextBox 21"/>
+                <p:cNvSpPr txBox="1">
+                  <a:spLocks noRot="1" noChangeAspect="1" noMove="1" noResize="1" noEditPoints="1" noAdjustHandles="1" noChangeArrowheads="1" noChangeShapeType="1" noTextEdit="1"/>
+                </p:cNvSpPr>
+                <p:nvPr/>
+              </p:nvSpPr>
+              <p:spPr>
+                <a:xfrm>
+                  <a:off x="5932172" y="2180045"/>
+                  <a:ext cx="1589089" cy="369332"/>
+                </a:xfrm>
+                <a:prstGeom prst="rect">
+                  <a:avLst/>
+                </a:prstGeom>
+                <a:blipFill>
+                  <a:blip r:embed="rId4"/>
+                  <a:stretch>
+                    <a:fillRect l="-3065" t="-10000" b="-26667"/>
+                  </a:stretch>
+                </a:blipFill>
+              </p:spPr>
+              <p:txBody>
+                <a:bodyPr/>
+                <a:lstStyle/>
+                <a:p>
+                  <a:r>
+                    <a:rPr lang="en-GB">
+                      <a:noFill/>
+                    </a:rPr>
+                    <a:t> </a:t>
+                  </a:r>
+                </a:p>
+              </p:txBody>
+            </p:sp>
+          </mc:Fallback>
+        </mc:AlternateContent>
+        <mc:AlternateContent xmlns:mc="http://schemas.openxmlformats.org/markup-compatibility/2006" xmlns:a14="http://schemas.microsoft.com/office/drawing/2010/main">
+          <mc:Choice Requires="a14">
+            <p:sp>
+              <p:nvSpPr>
+                <p:cNvPr id="19" name="TextBox 18"/>
+                <p:cNvSpPr txBox="1"/>
+                <p:nvPr/>
+              </p:nvSpPr>
+              <p:spPr>
+                <a:xfrm>
+                  <a:off x="5932173" y="4032092"/>
+                  <a:ext cx="1589089" cy="369332"/>
+                </a:xfrm>
+                <a:prstGeom prst="rect">
+                  <a:avLst/>
+                </a:prstGeom>
+                <a:noFill/>
+              </p:spPr>
+              <p:txBody>
+                <a:bodyPr wrap="none" rtlCol="0">
+                  <a:spAutoFit/>
+                </a:bodyPr>
+                <a:lstStyle/>
+                <a:p>
+                  <a:r>
+                    <a:rPr lang="en-GB" dirty="0" smtClean="0"/>
+                    <a:t>Soil layer </a:t>
+                  </a:r>
+                  <a14:m>
+                    <m:oMath xmlns:m="http://schemas.openxmlformats.org/officeDocument/2006/math">
+                      <m:r>
+                        <a:rPr lang="en-GB" b="0" i="1" smtClean="0">
+                          <a:latin typeface="Cambria Math" panose="02040503050406030204" pitchFamily="18" charset="0"/>
+                        </a:rPr>
+                        <m:t>𝑙</m:t>
+                      </m:r>
+                      <m:r>
+                        <a:rPr lang="en-GB" b="0" i="1" smtClean="0">
+                          <a:latin typeface="Cambria Math" panose="02040503050406030204" pitchFamily="18" charset="0"/>
+                        </a:rPr>
+                        <m:t>=2</m:t>
+                      </m:r>
+                    </m:oMath>
+                  </a14:m>
+                  <a:endParaRPr lang="en-GB" dirty="0"/>
+                </a:p>
+              </p:txBody>
+            </p:sp>
+          </mc:Choice>
+          <mc:Fallback xmlns="">
+            <p:sp>
+              <p:nvSpPr>
+                <p:cNvPr id="23" name="TextBox 22"/>
+                <p:cNvSpPr txBox="1">
+                  <a:spLocks noRot="1" noChangeAspect="1" noMove="1" noResize="1" noEditPoints="1" noAdjustHandles="1" noChangeArrowheads="1" noChangeShapeType="1" noTextEdit="1"/>
+                </p:cNvSpPr>
+                <p:nvPr/>
+              </p:nvSpPr>
+              <p:spPr>
+                <a:xfrm>
+                  <a:off x="5932173" y="4032092"/>
+                  <a:ext cx="1589089" cy="369332"/>
+                </a:xfrm>
+                <a:prstGeom prst="rect">
+                  <a:avLst/>
+                </a:prstGeom>
+                <a:blipFill>
+                  <a:blip r:embed="rId5"/>
+                  <a:stretch>
+                    <a:fillRect l="-3065" t="-10000" b="-26667"/>
+                  </a:stretch>
+                </a:blipFill>
+              </p:spPr>
+              <p:txBody>
+                <a:bodyPr/>
+                <a:lstStyle/>
+                <a:p>
+                  <a:r>
+                    <a:rPr lang="en-GB">
+                      <a:noFill/>
+                    </a:rPr>
+                    <a:t> </a:t>
+                  </a:r>
+                </a:p>
+              </p:txBody>
+            </p:sp>
+          </mc:Fallback>
+        </mc:AlternateContent>
+        <mc:AlternateContent xmlns:mc="http://schemas.openxmlformats.org/markup-compatibility/2006">
+          <mc:Choice xmlns:a14="http://schemas.microsoft.com/office/drawing/2010/main" Requires="a14">
+            <p:sp>
+              <p:nvSpPr>
+                <p:cNvPr id="20" name="TextBox 19"/>
+                <p:cNvSpPr txBox="1"/>
+                <p:nvPr/>
+              </p:nvSpPr>
+              <p:spPr>
+                <a:xfrm>
+                  <a:off x="7376339" y="2871990"/>
+                  <a:ext cx="911083" cy="369332"/>
+                </a:xfrm>
+                <a:prstGeom prst="rect">
+                  <a:avLst/>
+                </a:prstGeom>
+                <a:noFill/>
+              </p:spPr>
+              <p:txBody>
+                <a:bodyPr wrap="none" rtlCol="0">
+                  <a:spAutoFit/>
+                </a:bodyPr>
+                <a:lstStyle/>
+                <a:p>
+                  <a:pPr/>
+                  <a14:m>
+                    <m:oMathPara xmlns:m="http://schemas.openxmlformats.org/officeDocument/2006/math">
+                      <m:oMathParaPr>
+                        <m:jc m:val="centerGroup"/>
+                      </m:oMathParaPr>
+                      <m:oMath xmlns:m="http://schemas.openxmlformats.org/officeDocument/2006/math">
+                        <m:sSub>
+                          <m:sSubPr>
+                            <m:ctrlPr>
+                              <a:rPr lang="en-GB" b="0" i="1" smtClean="0">
+                                <a:latin typeface="Cambria Math" panose="02040503050406030204" pitchFamily="18" charset="0"/>
+                              </a:rPr>
+                            </m:ctrlPr>
+                          </m:sSubPr>
+                          <m:e>
+                            <m:r>
+                              <a:rPr lang="en-GB" b="0" i="1" smtClean="0">
+                                <a:latin typeface="Cambria Math" panose="02040503050406030204" pitchFamily="18" charset="0"/>
+                              </a:rPr>
+                              <m:t>𝑚</m:t>
+                            </m:r>
+                          </m:e>
+                          <m:sub>
+                            <m:r>
+                              <a:rPr lang="en-GB" b="0" i="1" smtClean="0">
+                                <a:latin typeface="Cambria Math" panose="02040503050406030204" pitchFamily="18" charset="0"/>
+                              </a:rPr>
+                              <m:t>1:2</m:t>
+                            </m:r>
+                          </m:sub>
+                        </m:sSub>
+                        <m:r>
+                          <m:rPr>
+                            <m:sty m:val="p"/>
+                          </m:rPr>
+                          <a:rPr lang="en-GB" b="0" i="0" smtClean="0">
+                            <a:latin typeface="Cambria Math" panose="02040503050406030204" pitchFamily="18" charset="0"/>
+                          </a:rPr>
+                          <m:t>Δ</m:t>
+                        </m:r>
+                        <m:r>
+                          <a:rPr lang="en-GB" b="0" i="1" smtClean="0">
+                            <a:latin typeface="Cambria Math" panose="02040503050406030204" pitchFamily="18" charset="0"/>
+                          </a:rPr>
+                          <m:t>𝑡</m:t>
+                        </m:r>
+                      </m:oMath>
+                    </m:oMathPara>
+                  </a14:m>
+                  <a:endParaRPr lang="en-GB" b="0" dirty="0" smtClean="0"/>
+                </a:p>
+              </p:txBody>
+            </p:sp>
+          </mc:Choice>
+          <mc:Fallback>
+            <p:sp>
+              <p:nvSpPr>
+                <p:cNvPr id="20" name="TextBox 19"/>
+                <p:cNvSpPr txBox="1">
+                  <a:spLocks noRot="1" noChangeAspect="1" noMove="1" noResize="1" noEditPoints="1" noAdjustHandles="1" noChangeArrowheads="1" noChangeShapeType="1" noTextEdit="1"/>
+                </p:cNvSpPr>
+                <p:nvPr/>
+              </p:nvSpPr>
+              <p:spPr>
+                <a:xfrm>
+                  <a:off x="7376339" y="2871990"/>
+                  <a:ext cx="911083" cy="369332"/>
+                </a:xfrm>
+                <a:prstGeom prst="rect">
+                  <a:avLst/>
+                </a:prstGeom>
+                <a:blipFill>
+                  <a:blip r:embed="rId6"/>
+                  <a:stretch>
+                    <a:fillRect/>
+                  </a:stretch>
+                </a:blipFill>
+              </p:spPr>
+              <p:txBody>
+                <a:bodyPr/>
+                <a:lstStyle/>
+                <a:p>
+                  <a:r>
+                    <a:rPr lang="en-GB">
+                      <a:noFill/>
+                    </a:rPr>
+                    <a:t> </a:t>
+                  </a:r>
+                </a:p>
+              </p:txBody>
+            </p:sp>
+          </mc:Fallback>
+        </mc:AlternateContent>
+        <mc:AlternateContent xmlns:mc="http://schemas.openxmlformats.org/markup-compatibility/2006">
+          <mc:Choice xmlns:a14="http://schemas.microsoft.com/office/drawing/2010/main" Requires="a14">
+            <p:sp>
+              <p:nvSpPr>
+                <p:cNvPr id="21" name="TextBox 20"/>
+                <p:cNvSpPr txBox="1"/>
+                <p:nvPr/>
+              </p:nvSpPr>
+              <p:spPr>
+                <a:xfrm>
+                  <a:off x="7376339" y="3315994"/>
+                  <a:ext cx="911083" cy="369332"/>
+                </a:xfrm>
+                <a:prstGeom prst="rect">
+                  <a:avLst/>
+                </a:prstGeom>
+                <a:noFill/>
+              </p:spPr>
+              <p:txBody>
+                <a:bodyPr wrap="none" rtlCol="0">
+                  <a:spAutoFit/>
+                </a:bodyPr>
+                <a:lstStyle/>
+                <a:p>
+                  <a:pPr/>
+                  <a14:m>
+                    <m:oMathPara xmlns:m="http://schemas.openxmlformats.org/officeDocument/2006/math">
+                      <m:oMathParaPr>
+                        <m:jc m:val="centerGroup"/>
+                      </m:oMathParaPr>
+                      <m:oMath xmlns:m="http://schemas.openxmlformats.org/officeDocument/2006/math">
+                        <m:sSub>
+                          <m:sSubPr>
+                            <m:ctrlPr>
+                              <a:rPr lang="en-GB" b="0" i="1" smtClean="0">
+                                <a:latin typeface="Cambria Math" panose="02040503050406030204" pitchFamily="18" charset="0"/>
+                              </a:rPr>
+                            </m:ctrlPr>
+                          </m:sSubPr>
+                          <m:e>
+                            <m:r>
+                              <a:rPr lang="en-GB" b="0" i="1" smtClean="0">
+                                <a:latin typeface="Cambria Math" panose="02040503050406030204" pitchFamily="18" charset="0"/>
+                              </a:rPr>
+                              <m:t>𝑚</m:t>
+                            </m:r>
+                          </m:e>
+                          <m:sub>
+                            <m:r>
+                              <a:rPr lang="en-GB" b="0" i="1" smtClean="0">
+                                <a:latin typeface="Cambria Math" panose="02040503050406030204" pitchFamily="18" charset="0"/>
+                              </a:rPr>
+                              <m:t>1:2</m:t>
+                            </m:r>
+                          </m:sub>
+                        </m:sSub>
+                        <m:r>
+                          <m:rPr>
+                            <m:sty m:val="p"/>
+                          </m:rPr>
+                          <a:rPr lang="en-GB" b="0" i="0" smtClean="0">
+                            <a:latin typeface="Cambria Math" panose="02040503050406030204" pitchFamily="18" charset="0"/>
+                          </a:rPr>
+                          <m:t>Δ</m:t>
+                        </m:r>
+                        <m:r>
+                          <a:rPr lang="en-GB" b="0" i="1" smtClean="0">
+                            <a:latin typeface="Cambria Math" panose="02040503050406030204" pitchFamily="18" charset="0"/>
+                          </a:rPr>
+                          <m:t>𝑡</m:t>
+                        </m:r>
+                      </m:oMath>
+                    </m:oMathPara>
+                  </a14:m>
+                  <a:endParaRPr lang="en-GB" b="0" dirty="0" smtClean="0"/>
+                </a:p>
+              </p:txBody>
+            </p:sp>
+          </mc:Choice>
+          <mc:Fallback>
+            <p:sp>
+              <p:nvSpPr>
+                <p:cNvPr id="21" name="TextBox 20"/>
+                <p:cNvSpPr txBox="1">
+                  <a:spLocks noRot="1" noChangeAspect="1" noMove="1" noResize="1" noEditPoints="1" noAdjustHandles="1" noChangeArrowheads="1" noChangeShapeType="1" noTextEdit="1"/>
+                </p:cNvSpPr>
+                <p:nvPr/>
+              </p:nvSpPr>
+              <p:spPr>
+                <a:xfrm>
+                  <a:off x="7376339" y="3315994"/>
+                  <a:ext cx="911083" cy="369332"/>
+                </a:xfrm>
+                <a:prstGeom prst="rect">
+                  <a:avLst/>
+                </a:prstGeom>
+                <a:blipFill>
+                  <a:blip r:embed="rId7"/>
+                  <a:stretch>
+                    <a:fillRect/>
+                  </a:stretch>
+                </a:blipFill>
+              </p:spPr>
+              <p:txBody>
+                <a:bodyPr/>
+                <a:lstStyle/>
+                <a:p>
+                  <a:r>
+                    <a:rPr lang="en-GB">
+                      <a:noFill/>
+                    </a:rPr>
+                    <a:t> </a:t>
+                  </a:r>
+                </a:p>
+              </p:txBody>
+            </p:sp>
+          </mc:Fallback>
+        </mc:AlternateContent>
+        <p:cxnSp>
+          <p:nvCxnSpPr>
+            <p:cNvPr id="22" name="Straight Arrow Connector 21"/>
+            <p:cNvCxnSpPr/>
+            <p:nvPr/>
+          </p:nvCxnSpPr>
+          <p:spPr>
+            <a:xfrm>
+              <a:off x="7328079" y="4935829"/>
+              <a:ext cx="0" cy="215721"/>
+            </a:xfrm>
+            <a:prstGeom prst="straightConnector1">
+              <a:avLst/>
+            </a:prstGeom>
+            <a:ln>
+              <a:headEnd type="triangle"/>
+              <a:tailEnd type="triangle"/>
+            </a:ln>
+          </p:spPr>
+          <p:style>
+            <a:lnRef idx="1">
+              <a:schemeClr val="dk1"/>
+            </a:lnRef>
+            <a:fillRef idx="0">
+              <a:schemeClr val="dk1"/>
+            </a:fillRef>
+            <a:effectRef idx="0">
+              <a:schemeClr val="dk1"/>
+            </a:effectRef>
+            <a:fontRef idx="minor">
+              <a:schemeClr val="tx1"/>
+            </a:fontRef>
+          </p:style>
+        </p:cxnSp>
+        <p:cxnSp>
+          <p:nvCxnSpPr>
+            <p:cNvPr id="23" name="Straight Arrow Connector 22"/>
+            <p:cNvCxnSpPr/>
+            <p:nvPr/>
+          </p:nvCxnSpPr>
+          <p:spPr>
+            <a:xfrm>
+              <a:off x="7328079" y="5151550"/>
+              <a:ext cx="0" cy="215721"/>
+            </a:xfrm>
+            <a:prstGeom prst="straightConnector1">
+              <a:avLst/>
+            </a:prstGeom>
+            <a:ln>
+              <a:headEnd type="triangle"/>
+              <a:tailEnd type="triangle"/>
+            </a:ln>
+          </p:spPr>
+          <p:style>
+            <a:lnRef idx="1">
+              <a:schemeClr val="dk1"/>
+            </a:lnRef>
+            <a:fillRef idx="0">
+              <a:schemeClr val="dk1"/>
+            </a:fillRef>
+            <a:effectRef idx="0">
+              <a:schemeClr val="dk1"/>
+            </a:effectRef>
+            <a:fontRef idx="minor">
+              <a:schemeClr val="tx1"/>
+            </a:fontRef>
+          </p:style>
+        </p:cxnSp>
+        <mc:AlternateContent xmlns:mc="http://schemas.openxmlformats.org/markup-compatibility/2006">
+          <mc:Choice xmlns:a14="http://schemas.microsoft.com/office/drawing/2010/main" Requires="a14">
+            <p:sp>
+              <p:nvSpPr>
+                <p:cNvPr id="24" name="TextBox 23"/>
+                <p:cNvSpPr txBox="1"/>
+                <p:nvPr/>
+              </p:nvSpPr>
+              <p:spPr>
+                <a:xfrm>
+                  <a:off x="7376339" y="4840283"/>
+                  <a:ext cx="916405" cy="369332"/>
+                </a:xfrm>
+                <a:prstGeom prst="rect">
+                  <a:avLst/>
+                </a:prstGeom>
+                <a:noFill/>
+              </p:spPr>
+              <p:txBody>
+                <a:bodyPr wrap="none" rtlCol="0">
+                  <a:spAutoFit/>
+                </a:bodyPr>
+                <a:lstStyle/>
+                <a:p>
+                  <a:pPr/>
+                  <a14:m>
+                    <m:oMathPara xmlns:m="http://schemas.openxmlformats.org/officeDocument/2006/math">
+                      <m:oMathParaPr>
+                        <m:jc m:val="centerGroup"/>
+                      </m:oMathParaPr>
+                      <m:oMath xmlns:m="http://schemas.openxmlformats.org/officeDocument/2006/math">
+                        <m:sSub>
+                          <m:sSubPr>
+                            <m:ctrlPr>
+                              <a:rPr lang="en-GB" b="0" i="1" smtClean="0">
+                                <a:latin typeface="Cambria Math" panose="02040503050406030204" pitchFamily="18" charset="0"/>
+                              </a:rPr>
+                            </m:ctrlPr>
+                          </m:sSubPr>
+                          <m:e>
+                            <m:r>
+                              <a:rPr lang="en-GB" b="0" i="1" smtClean="0">
+                                <a:latin typeface="Cambria Math" panose="02040503050406030204" pitchFamily="18" charset="0"/>
+                              </a:rPr>
+                              <m:t>𝑚</m:t>
+                            </m:r>
+                          </m:e>
+                          <m:sub>
+                            <m:r>
+                              <a:rPr lang="en-GB" b="0" i="1" smtClean="0">
+                                <a:latin typeface="Cambria Math" panose="02040503050406030204" pitchFamily="18" charset="0"/>
+                              </a:rPr>
+                              <m:t>2:3</m:t>
+                            </m:r>
+                          </m:sub>
+                        </m:sSub>
+                        <m:r>
+                          <m:rPr>
+                            <m:sty m:val="p"/>
+                          </m:rPr>
+                          <a:rPr lang="en-GB" b="0" i="0" smtClean="0">
+                            <a:latin typeface="Cambria Math" panose="02040503050406030204" pitchFamily="18" charset="0"/>
+                          </a:rPr>
+                          <m:t>Δ</m:t>
+                        </m:r>
+                        <m:r>
+                          <a:rPr lang="en-GB" b="0" i="1" smtClean="0">
+                            <a:latin typeface="Cambria Math" panose="02040503050406030204" pitchFamily="18" charset="0"/>
+                          </a:rPr>
+                          <m:t>𝑡</m:t>
+                        </m:r>
+                      </m:oMath>
+                    </m:oMathPara>
+                  </a14:m>
+                  <a:endParaRPr lang="en-GB" b="0" dirty="0" smtClean="0"/>
+                </a:p>
+              </p:txBody>
+            </p:sp>
+          </mc:Choice>
+          <mc:Fallback>
+            <p:sp>
+              <p:nvSpPr>
+                <p:cNvPr id="24" name="TextBox 23"/>
+                <p:cNvSpPr txBox="1">
+                  <a:spLocks noRot="1" noChangeAspect="1" noMove="1" noResize="1" noEditPoints="1" noAdjustHandles="1" noChangeArrowheads="1" noChangeShapeType="1" noTextEdit="1"/>
+                </p:cNvSpPr>
+                <p:nvPr/>
+              </p:nvSpPr>
+              <p:spPr>
+                <a:xfrm>
+                  <a:off x="7376339" y="4840283"/>
+                  <a:ext cx="916405" cy="369332"/>
+                </a:xfrm>
+                <a:prstGeom prst="rect">
+                  <a:avLst/>
+                </a:prstGeom>
+                <a:blipFill>
+                  <a:blip r:embed="rId8"/>
+                  <a:stretch>
+                    <a:fillRect/>
+                  </a:stretch>
+                </a:blipFill>
+              </p:spPr>
+              <p:txBody>
+                <a:bodyPr/>
+                <a:lstStyle/>
+                <a:p>
+                  <a:r>
+                    <a:rPr lang="en-GB">
+                      <a:noFill/>
+                    </a:rPr>
+                    <a:t> </a:t>
+                  </a:r>
+                </a:p>
+              </p:txBody>
+            </p:sp>
+          </mc:Fallback>
+        </mc:AlternateContent>
+        <mc:AlternateContent xmlns:mc="http://schemas.openxmlformats.org/markup-compatibility/2006">
+          <mc:Choice xmlns:a14="http://schemas.microsoft.com/office/drawing/2010/main" Requires="a14">
+            <p:sp>
+              <p:nvSpPr>
+                <p:cNvPr id="25" name="TextBox 24"/>
+                <p:cNvSpPr txBox="1"/>
+                <p:nvPr/>
+              </p:nvSpPr>
+              <p:spPr>
+                <a:xfrm>
+                  <a:off x="7376339" y="5079987"/>
+                  <a:ext cx="916405" cy="369332"/>
+                </a:xfrm>
+                <a:prstGeom prst="rect">
+                  <a:avLst/>
+                </a:prstGeom>
+                <a:noFill/>
+              </p:spPr>
+              <p:txBody>
+                <a:bodyPr wrap="none" rtlCol="0">
+                  <a:spAutoFit/>
+                </a:bodyPr>
+                <a:lstStyle/>
+                <a:p>
+                  <a:pPr/>
+                  <a14:m>
+                    <m:oMathPara xmlns:m="http://schemas.openxmlformats.org/officeDocument/2006/math">
+                      <m:oMathParaPr>
+                        <m:jc m:val="centerGroup"/>
+                      </m:oMathParaPr>
+                      <m:oMath xmlns:m="http://schemas.openxmlformats.org/officeDocument/2006/math">
+                        <m:sSub>
+                          <m:sSubPr>
+                            <m:ctrlPr>
+                              <a:rPr lang="en-GB" b="0" i="1" smtClean="0">
+                                <a:latin typeface="Cambria Math" panose="02040503050406030204" pitchFamily="18" charset="0"/>
+                              </a:rPr>
+                            </m:ctrlPr>
+                          </m:sSubPr>
+                          <m:e>
+                            <m:r>
+                              <a:rPr lang="en-GB" b="0" i="1" smtClean="0">
+                                <a:latin typeface="Cambria Math" panose="02040503050406030204" pitchFamily="18" charset="0"/>
+                              </a:rPr>
+                              <m:t>𝑚</m:t>
+                            </m:r>
+                          </m:e>
+                          <m:sub>
+                            <m:r>
+                              <a:rPr lang="en-GB" b="0" i="1" smtClean="0">
+                                <a:latin typeface="Cambria Math" panose="02040503050406030204" pitchFamily="18" charset="0"/>
+                              </a:rPr>
+                              <m:t>2:3</m:t>
+                            </m:r>
+                          </m:sub>
+                        </m:sSub>
+                        <m:r>
+                          <m:rPr>
+                            <m:sty m:val="p"/>
+                          </m:rPr>
+                          <a:rPr lang="en-GB" b="0" i="0" smtClean="0">
+                            <a:latin typeface="Cambria Math" panose="02040503050406030204" pitchFamily="18" charset="0"/>
+                          </a:rPr>
+                          <m:t>Δ</m:t>
+                        </m:r>
+                        <m:r>
+                          <a:rPr lang="en-GB" b="0" i="1" smtClean="0">
+                            <a:latin typeface="Cambria Math" panose="02040503050406030204" pitchFamily="18" charset="0"/>
+                          </a:rPr>
+                          <m:t>𝑡</m:t>
+                        </m:r>
+                      </m:oMath>
+                    </m:oMathPara>
+                  </a14:m>
+                  <a:endParaRPr lang="en-GB" b="0" dirty="0" smtClean="0"/>
+                </a:p>
+              </p:txBody>
+            </p:sp>
+          </mc:Choice>
+          <mc:Fallback>
+            <p:sp>
+              <p:nvSpPr>
+                <p:cNvPr id="25" name="TextBox 24"/>
+                <p:cNvSpPr txBox="1">
+                  <a:spLocks noRot="1" noChangeAspect="1" noMove="1" noResize="1" noEditPoints="1" noAdjustHandles="1" noChangeArrowheads="1" noChangeShapeType="1" noTextEdit="1"/>
+                </p:cNvSpPr>
+                <p:nvPr/>
+              </p:nvSpPr>
+              <p:spPr>
+                <a:xfrm>
+                  <a:off x="7376339" y="5079987"/>
+                  <a:ext cx="916405" cy="369332"/>
+                </a:xfrm>
+                <a:prstGeom prst="rect">
+                  <a:avLst/>
+                </a:prstGeom>
+                <a:blipFill>
+                  <a:blip r:embed="rId9"/>
+                  <a:stretch>
+                    <a:fillRect/>
+                  </a:stretch>
+                </a:blipFill>
+              </p:spPr>
+              <p:txBody>
+                <a:bodyPr/>
+                <a:lstStyle/>
+                <a:p>
+                  <a:r>
+                    <a:rPr lang="en-GB">
+                      <a:noFill/>
+                    </a:rPr>
+                    <a:t> </a:t>
+                  </a:r>
+                </a:p>
+              </p:txBody>
+            </p:sp>
+          </mc:Fallback>
+        </mc:AlternateContent>
+        <mc:AlternateContent xmlns:mc="http://schemas.openxmlformats.org/markup-compatibility/2006">
+          <mc:Choice xmlns:a14="http://schemas.microsoft.com/office/drawing/2010/main" Requires="a14">
+            <p:sp>
+              <p:nvSpPr>
+                <p:cNvPr id="26" name="TextBox 25"/>
+                <p:cNvSpPr txBox="1"/>
+                <p:nvPr/>
+              </p:nvSpPr>
+              <p:spPr>
+                <a:xfrm>
+                  <a:off x="4287920" y="2175387"/>
+                  <a:ext cx="872290" cy="369332"/>
+                </a:xfrm>
+                <a:prstGeom prst="rect">
+                  <a:avLst/>
+                </a:prstGeom>
+                <a:noFill/>
+              </p:spPr>
+              <p:txBody>
+                <a:bodyPr wrap="none" rtlCol="0">
+                  <a:spAutoFit/>
+                </a:bodyPr>
+                <a:lstStyle/>
+                <a:p>
+                  <a:pPr/>
+                  <a14:m>
+                    <m:oMathPara xmlns:m="http://schemas.openxmlformats.org/officeDocument/2006/math">
+                      <m:oMathParaPr>
+                        <m:jc m:val="centerGroup"/>
+                      </m:oMathParaPr>
+                      <m:oMath xmlns:m="http://schemas.openxmlformats.org/officeDocument/2006/math">
+                        <m:sSub>
+                          <m:sSubPr>
+                            <m:ctrlPr>
+                              <a:rPr lang="en-GB" b="0" i="1" smtClean="0">
+                                <a:latin typeface="Cambria Math" panose="02040503050406030204" pitchFamily="18" charset="0"/>
+                              </a:rPr>
+                            </m:ctrlPr>
+                          </m:sSubPr>
+                          <m:e>
+                            <m:d>
+                              <m:dPr>
+                                <m:begChr m:val="["/>
+                                <m:endChr m:val="]"/>
+                                <m:ctrlPr>
+                                  <a:rPr lang="en-GB" b="0" i="1" smtClean="0">
+                                    <a:latin typeface="Cambria Math" panose="02040503050406030204" pitchFamily="18" charset="0"/>
+                                  </a:rPr>
+                                </m:ctrlPr>
+                              </m:dPr>
+                              <m:e>
+                                <m:r>
+                                  <m:rPr>
+                                    <m:sty m:val="p"/>
+                                  </m:rPr>
+                                  <a:rPr lang="en-GB" b="0" i="0" smtClean="0">
+                                    <a:latin typeface="Cambria Math" panose="02040503050406030204" pitchFamily="18" charset="0"/>
+                                  </a:rPr>
+                                  <m:t>NM</m:t>
+                                </m:r>
+                              </m:e>
+                            </m:d>
+                          </m:e>
+                          <m:sub>
+                            <m:r>
+                              <a:rPr lang="en-GB" b="0" i="1" smtClean="0">
+                                <a:latin typeface="Cambria Math" panose="02040503050406030204" pitchFamily="18" charset="0"/>
+                              </a:rPr>
+                              <m:t>1</m:t>
+                            </m:r>
+                          </m:sub>
+                        </m:sSub>
+                      </m:oMath>
+                    </m:oMathPara>
+                  </a14:m>
+                  <a:endParaRPr lang="en-GB" dirty="0"/>
+                </a:p>
+              </p:txBody>
+            </p:sp>
+          </mc:Choice>
+          <mc:Fallback>
+            <p:sp>
+              <p:nvSpPr>
+                <p:cNvPr id="26" name="TextBox 25"/>
+                <p:cNvSpPr txBox="1">
+                  <a:spLocks noRot="1" noChangeAspect="1" noMove="1" noResize="1" noEditPoints="1" noAdjustHandles="1" noChangeArrowheads="1" noChangeShapeType="1" noTextEdit="1"/>
+                </p:cNvSpPr>
+                <p:nvPr/>
+              </p:nvSpPr>
+              <p:spPr>
+                <a:xfrm>
+                  <a:off x="4287920" y="2175387"/>
+                  <a:ext cx="872290" cy="369332"/>
+                </a:xfrm>
+                <a:prstGeom prst="rect">
+                  <a:avLst/>
+                </a:prstGeom>
+                <a:blipFill>
+                  <a:blip r:embed="rId10"/>
+                  <a:stretch>
+                    <a:fillRect/>
+                  </a:stretch>
+                </a:blipFill>
+              </p:spPr>
+              <p:txBody>
+                <a:bodyPr/>
+                <a:lstStyle/>
+                <a:p>
+                  <a:r>
+                    <a:rPr lang="en-GB">
+                      <a:noFill/>
+                    </a:rPr>
+                    <a:t> </a:t>
+                  </a:r>
+                </a:p>
+              </p:txBody>
+            </p:sp>
+          </mc:Fallback>
+        </mc:AlternateContent>
+        <mc:AlternateContent xmlns:mc="http://schemas.openxmlformats.org/markup-compatibility/2006">
+          <mc:Choice xmlns:a14="http://schemas.microsoft.com/office/drawing/2010/main" Requires="a14">
+            <p:sp>
+              <p:nvSpPr>
+                <p:cNvPr id="27" name="TextBox 26"/>
+                <p:cNvSpPr txBox="1"/>
+                <p:nvPr/>
+              </p:nvSpPr>
+              <p:spPr>
+                <a:xfrm>
+                  <a:off x="4287920" y="4032092"/>
+                  <a:ext cx="851130" cy="369332"/>
+                </a:xfrm>
+                <a:prstGeom prst="rect">
+                  <a:avLst/>
+                </a:prstGeom>
+                <a:noFill/>
+              </p:spPr>
+              <p:txBody>
+                <a:bodyPr wrap="none" rtlCol="0">
+                  <a:spAutoFit/>
+                </a:bodyPr>
+                <a:lstStyle/>
+                <a:p>
+                  <a:pPr/>
+                  <a14:m>
+                    <m:oMathPara xmlns:m="http://schemas.openxmlformats.org/officeDocument/2006/math">
+                      <m:oMathParaPr>
+                        <m:jc m:val="centerGroup"/>
+                      </m:oMathParaPr>
+                      <m:oMath xmlns:m="http://schemas.openxmlformats.org/officeDocument/2006/math">
+                        <m:sSub>
+                          <m:sSubPr>
+                            <m:ctrlPr>
+                              <a:rPr lang="en-GB" b="0" i="1" smtClean="0">
+                                <a:latin typeface="Cambria Math" panose="02040503050406030204" pitchFamily="18" charset="0"/>
+                              </a:rPr>
+                            </m:ctrlPr>
+                          </m:sSubPr>
+                          <m:e>
+                            <m:d>
+                              <m:dPr>
+                                <m:begChr m:val="["/>
+                                <m:endChr m:val="]"/>
+                                <m:ctrlPr>
+                                  <a:rPr lang="en-GB" b="0" i="1" smtClean="0">
+                                    <a:latin typeface="Cambria Math" panose="02040503050406030204" pitchFamily="18" charset="0"/>
+                                  </a:rPr>
+                                </m:ctrlPr>
+                              </m:dPr>
+                              <m:e>
+                                <m:r>
+                                  <m:rPr>
+                                    <m:sty m:val="p"/>
+                                  </m:rPr>
+                                  <a:rPr lang="en-GB" b="0" i="0" smtClean="0">
+                                    <a:latin typeface="Cambria Math" panose="02040503050406030204" pitchFamily="18" charset="0"/>
+                                  </a:rPr>
+                                  <m:t>NM</m:t>
+                                </m:r>
+                              </m:e>
+                            </m:d>
+                          </m:e>
+                          <m:sub>
+                            <m:r>
+                              <a:rPr lang="en-GB" b="0" i="1" smtClean="0">
+                                <a:latin typeface="Cambria Math" panose="02040503050406030204" pitchFamily="18" charset="0"/>
+                              </a:rPr>
+                              <m:t>2</m:t>
+                            </m:r>
+                          </m:sub>
+                        </m:sSub>
+                      </m:oMath>
+                    </m:oMathPara>
+                  </a14:m>
+                  <a:endParaRPr lang="en-GB" dirty="0"/>
+                </a:p>
+              </p:txBody>
+            </p:sp>
+          </mc:Choice>
+          <mc:Fallback>
+            <p:sp>
+              <p:nvSpPr>
+                <p:cNvPr id="27" name="TextBox 26"/>
+                <p:cNvSpPr txBox="1">
+                  <a:spLocks noRot="1" noChangeAspect="1" noMove="1" noResize="1" noEditPoints="1" noAdjustHandles="1" noChangeArrowheads="1" noChangeShapeType="1" noTextEdit="1"/>
+                </p:cNvSpPr>
+                <p:nvPr/>
+              </p:nvSpPr>
+              <p:spPr>
+                <a:xfrm>
+                  <a:off x="4287920" y="4032092"/>
+                  <a:ext cx="851130" cy="369332"/>
+                </a:xfrm>
+                <a:prstGeom prst="rect">
+                  <a:avLst/>
+                </a:prstGeom>
+                <a:blipFill>
+                  <a:blip r:embed="rId11"/>
+                  <a:stretch>
+                    <a:fillRect/>
+                  </a:stretch>
+                </a:blipFill>
+              </p:spPr>
+              <p:txBody>
+                <a:bodyPr/>
+                <a:lstStyle/>
+                <a:p>
+                  <a:r>
+                    <a:rPr lang="en-GB">
+                      <a:noFill/>
+                    </a:rPr>
+                    <a:t> </a:t>
+                  </a:r>
+                </a:p>
+              </p:txBody>
+            </p:sp>
+          </mc:Fallback>
+        </mc:AlternateContent>
+      </p:grpSp>
+    </p:spTree>
+    <p:extLst>
+      <p:ext uri="{BB962C8B-B14F-4D97-AF65-F5344CB8AC3E}">
+        <p14:creationId xmlns:p14="http://schemas.microsoft.com/office/powerpoint/2010/main" val="720116433"/>
       </p:ext>
     </p:extLst>
   </p:cSld>

</xml_diff>